<commit_message>
Fixed assimilation-related bugs in ensemble scripts.
</commit_message>
<xml_diff>
--- a/docs/NorCPM-CF_overview_20240904.pptx
+++ b/docs/NorCPM-CF_overview_20240904.pptx
@@ -215,7 +215,7 @@
           <a:p>
             <a:fld id="{386A3372-C556-4678-ADCC-3266A1490628}" type="datetimeFigureOut">
               <a:rPr lang="nb-NO" smtClean="0"/>
-              <a:t>06.09.2024</a:t>
+              <a:t>10.09.2024</a:t>
             </a:fld>
             <a:endParaRPr lang="nb-NO"/>
           </a:p>
@@ -8436,7 +8436,7 @@
                 <a:ea typeface="Menlo" panose="020B0609030804020204" pitchFamily="49" charset="0"/>
                 <a:cs typeface="Menlo" panose="020B0609030804020204" pitchFamily="49" charset="0"/>
               </a:rPr>
-              <a:t>NorCPMX</a:t>
+              <a:t>NorCPM</a:t>
             </a:r>
             <a:r>
               <a:rPr lang="en-GB" sz="1500" dirty="0">
@@ -8447,7 +8447,7 @@
                 <a:ea typeface="Menlo" panose="020B0609030804020204" pitchFamily="49" charset="0"/>
                 <a:cs typeface="Menlo" panose="020B0609030804020204" pitchFamily="49" charset="0"/>
               </a:rPr>
-              <a:t>/setup/noresm2</a:t>
+              <a:t>-CF/setup/noresm2</a:t>
             </a:r>
           </a:p>
           <a:p>

</xml_diff>